<commit_message>
CSV data as float32 + SBC image
</commit_message>
<xml_diff>
--- a/src/GUILayout/Images/Button_icons.pptx
+++ b/src/GUILayout/Images/Button_icons.pptx
@@ -10,6 +10,10 @@
     <p:sldId id="258" r:id="rId4"/>
     <p:sldId id="259" r:id="rId5"/>
     <p:sldId id="260" r:id="rId6"/>
+    <p:sldId id="263" r:id="rId7"/>
+    <p:sldId id="264" r:id="rId8"/>
+    <p:sldId id="262" r:id="rId9"/>
+    <p:sldId id="266" r:id="rId10"/>
   </p:sldIdLst>
   <p:sldSz cx="12192000" cy="6858000"/>
   <p:notesSz cx="6858000" cy="9144000"/>
@@ -4769,7 +4773,7 @@
           <a:p>
             <a:fld id="{5EED903C-5720-4BE7-A28A-679E9FB2154F}" type="datetimeFigureOut">
               <a:rPr lang="de-DE" smtClean="0"/>
-              <a:t>17.02.2022</a:t>
+              <a:t>28.02.2022</a:t>
             </a:fld>
             <a:endParaRPr lang="de-DE"/>
           </a:p>
@@ -4939,7 +4943,7 @@
           <a:p>
             <a:fld id="{5EED903C-5720-4BE7-A28A-679E9FB2154F}" type="datetimeFigureOut">
               <a:rPr lang="de-DE" smtClean="0"/>
-              <a:t>17.02.2022</a:t>
+              <a:t>28.02.2022</a:t>
             </a:fld>
             <a:endParaRPr lang="de-DE"/>
           </a:p>
@@ -5119,7 +5123,7 @@
           <a:p>
             <a:fld id="{5EED903C-5720-4BE7-A28A-679E9FB2154F}" type="datetimeFigureOut">
               <a:rPr lang="de-DE" smtClean="0"/>
-              <a:t>17.02.2022</a:t>
+              <a:t>28.02.2022</a:t>
             </a:fld>
             <a:endParaRPr lang="de-DE"/>
           </a:p>
@@ -5289,7 +5293,7 @@
           <a:p>
             <a:fld id="{5EED903C-5720-4BE7-A28A-679E9FB2154F}" type="datetimeFigureOut">
               <a:rPr lang="de-DE" smtClean="0"/>
-              <a:t>17.02.2022</a:t>
+              <a:t>28.02.2022</a:t>
             </a:fld>
             <a:endParaRPr lang="de-DE"/>
           </a:p>
@@ -5535,7 +5539,7 @@
           <a:p>
             <a:fld id="{5EED903C-5720-4BE7-A28A-679E9FB2154F}" type="datetimeFigureOut">
               <a:rPr lang="de-DE" smtClean="0"/>
-              <a:t>17.02.2022</a:t>
+              <a:t>28.02.2022</a:t>
             </a:fld>
             <a:endParaRPr lang="de-DE"/>
           </a:p>
@@ -5767,7 +5771,7 @@
           <a:p>
             <a:fld id="{5EED903C-5720-4BE7-A28A-679E9FB2154F}" type="datetimeFigureOut">
               <a:rPr lang="de-DE" smtClean="0"/>
-              <a:t>17.02.2022</a:t>
+              <a:t>28.02.2022</a:t>
             </a:fld>
             <a:endParaRPr lang="de-DE"/>
           </a:p>
@@ -6134,7 +6138,7 @@
           <a:p>
             <a:fld id="{5EED903C-5720-4BE7-A28A-679E9FB2154F}" type="datetimeFigureOut">
               <a:rPr lang="de-DE" smtClean="0"/>
-              <a:t>17.02.2022</a:t>
+              <a:t>28.02.2022</a:t>
             </a:fld>
             <a:endParaRPr lang="de-DE"/>
           </a:p>
@@ -6252,7 +6256,7 @@
           <a:p>
             <a:fld id="{5EED903C-5720-4BE7-A28A-679E9FB2154F}" type="datetimeFigureOut">
               <a:rPr lang="de-DE" smtClean="0"/>
-              <a:t>17.02.2022</a:t>
+              <a:t>28.02.2022</a:t>
             </a:fld>
             <a:endParaRPr lang="de-DE"/>
           </a:p>
@@ -6347,7 +6351,7 @@
           <a:p>
             <a:fld id="{5EED903C-5720-4BE7-A28A-679E9FB2154F}" type="datetimeFigureOut">
               <a:rPr lang="de-DE" smtClean="0"/>
-              <a:t>17.02.2022</a:t>
+              <a:t>28.02.2022</a:t>
             </a:fld>
             <a:endParaRPr lang="de-DE"/>
           </a:p>
@@ -6624,7 +6628,7 @@
           <a:p>
             <a:fld id="{5EED903C-5720-4BE7-A28A-679E9FB2154F}" type="datetimeFigureOut">
               <a:rPr lang="de-DE" smtClean="0"/>
-              <a:t>17.02.2022</a:t>
+              <a:t>28.02.2022</a:t>
             </a:fld>
             <a:endParaRPr lang="de-DE"/>
           </a:p>
@@ -6881,7 +6885,7 @@
           <a:p>
             <a:fld id="{5EED903C-5720-4BE7-A28A-679E9FB2154F}" type="datetimeFigureOut">
               <a:rPr lang="de-DE" smtClean="0"/>
-              <a:t>17.02.2022</a:t>
+              <a:t>28.02.2022</a:t>
             </a:fld>
             <a:endParaRPr lang="de-DE"/>
           </a:p>
@@ -7094,7 +7098,7 @@
           <a:p>
             <a:fld id="{5EED903C-5720-4BE7-A28A-679E9FB2154F}" type="datetimeFigureOut">
               <a:rPr lang="de-DE" smtClean="0"/>
-              <a:t>17.02.2022</a:t>
+              <a:t>28.02.2022</a:t>
             </a:fld>
             <a:endParaRPr lang="de-DE"/>
           </a:p>
@@ -8814,9 +8818,6 @@
                 </a:rPr>
                 <a:t>Value</a:t>
               </a:r>
-              <a:endParaRPr lang="de-DE" sz="1200" dirty="0">
-                <a:latin typeface="Arial Rounded MT Bold" panose="020F0704030504030204" pitchFamily="34" charset="0"/>
-              </a:endParaRPr>
             </a:p>
           </p:txBody>
         </p:sp>
@@ -11370,7 +11371,7 @@
                 <a14:useLocalDpi xmlns:a14="http://schemas.microsoft.com/office/drawing/2010/main" val="0"/>
               </a:ext>
               <a:ext uri="{96DAC541-7B7A-43D3-8B79-37D633B846F1}">
-                <asvg:svgBlip xmlns:asvg="http://schemas.microsoft.com/office/drawing/2016/SVG/main" xmlns="" r:embed="rId3"/>
+                <asvg:svgBlip xmlns="" xmlns:asvg="http://schemas.microsoft.com/office/drawing/2016/SVG/main" r:embed="rId3"/>
               </a:ext>
             </a:extLst>
           </a:blip>
@@ -11466,7 +11467,7 @@
                 <a14:useLocalDpi xmlns:a14="http://schemas.microsoft.com/office/drawing/2010/main" val="0"/>
               </a:ext>
               <a:ext uri="{96DAC541-7B7A-43D3-8B79-37D633B846F1}">
-                <asvg:svgBlip xmlns:asvg="http://schemas.microsoft.com/office/drawing/2016/SVG/main" xmlns="" r:embed="rId3"/>
+                <asvg:svgBlip xmlns="" xmlns:asvg="http://schemas.microsoft.com/office/drawing/2016/SVG/main" r:embed="rId3"/>
               </a:ext>
             </a:extLst>
           </a:blip>
@@ -11980,6 +11981,353 @@
 </p:sld>
 </file>
 
+<file path=ppt/slides/slide6.xml><?xml version="1.0" encoding="utf-8"?>
+<p:sld xmlns:a="http://schemas.openxmlformats.org/drawingml/2006/main" xmlns:r="http://schemas.openxmlformats.org/officeDocument/2006/relationships" xmlns:p="http://schemas.openxmlformats.org/presentationml/2006/main">
+  <p:cSld>
+    <p:spTree>
+      <p:nvGrpSpPr>
+        <p:cNvPr id="1" name=""/>
+        <p:cNvGrpSpPr/>
+        <p:nvPr/>
+      </p:nvGrpSpPr>
+      <p:grpSpPr>
+        <a:xfrm>
+          <a:off x="0" y="0"/>
+          <a:ext cx="0" cy="0"/>
+          <a:chOff x="0" y="0"/>
+          <a:chExt cx="0" cy="0"/>
+        </a:xfrm>
+      </p:grpSpPr>
+      <p:pic>
+        <p:nvPicPr>
+          <p:cNvPr id="4" name="Grafik 3"/>
+          <p:cNvPicPr>
+            <a:picLocks noChangeAspect="1"/>
+          </p:cNvPicPr>
+          <p:nvPr/>
+        </p:nvPicPr>
+        <p:blipFill>
+          <a:blip r:embed="rId2">
+            <a:extLst>
+              <a:ext uri="{28A0092B-C50C-407E-A947-70E740481C1C}">
+                <a14:useLocalDpi xmlns:a14="http://schemas.microsoft.com/office/drawing/2010/main" val="0"/>
+              </a:ext>
+            </a:extLst>
+          </a:blip>
+          <a:stretch>
+            <a:fillRect/>
+          </a:stretch>
+        </p:blipFill>
+        <p:spPr>
+          <a:xfrm>
+            <a:off x="2663930" y="0"/>
+            <a:ext cx="6864140" cy="6858000"/>
+          </a:xfrm>
+          <a:prstGeom prst="rect">
+            <a:avLst/>
+          </a:prstGeom>
+        </p:spPr>
+      </p:pic>
+    </p:spTree>
+    <p:extLst>
+      <p:ext uri="{BB962C8B-B14F-4D97-AF65-F5344CB8AC3E}">
+        <p14:creationId xmlns:p14="http://schemas.microsoft.com/office/powerpoint/2010/main" val="4174723455"/>
+      </p:ext>
+    </p:extLst>
+  </p:cSld>
+  <p:clrMapOvr>
+    <a:masterClrMapping/>
+  </p:clrMapOvr>
+</p:sld>
+</file>
+
+<file path=ppt/slides/slide7.xml><?xml version="1.0" encoding="utf-8"?>
+<p:sld xmlns:a="http://schemas.openxmlformats.org/drawingml/2006/main" xmlns:r="http://schemas.openxmlformats.org/officeDocument/2006/relationships" xmlns:p="http://schemas.openxmlformats.org/presentationml/2006/main">
+  <p:cSld>
+    <p:spTree>
+      <p:nvGrpSpPr>
+        <p:cNvPr id="1" name=""/>
+        <p:cNvGrpSpPr/>
+        <p:nvPr/>
+      </p:nvGrpSpPr>
+      <p:grpSpPr>
+        <a:xfrm>
+          <a:off x="0" y="0"/>
+          <a:ext cx="0" cy="0"/>
+          <a:chOff x="0" y="0"/>
+          <a:chExt cx="0" cy="0"/>
+        </a:xfrm>
+      </p:grpSpPr>
+      <p:pic>
+        <p:nvPicPr>
+          <p:cNvPr id="2" name="Grafik 1"/>
+          <p:cNvPicPr>
+            <a:picLocks noChangeAspect="1"/>
+          </p:cNvPicPr>
+          <p:nvPr/>
+        </p:nvPicPr>
+        <p:blipFill>
+          <a:blip r:embed="rId2">
+            <a:extLst>
+              <a:ext uri="{28A0092B-C50C-407E-A947-70E740481C1C}">
+                <a14:useLocalDpi xmlns:a14="http://schemas.microsoft.com/office/drawing/2010/main" val="0"/>
+              </a:ext>
+            </a:extLst>
+          </a:blip>
+          <a:stretch>
+            <a:fillRect/>
+          </a:stretch>
+        </p:blipFill>
+        <p:spPr>
+          <a:xfrm>
+            <a:off x="2667000" y="0"/>
+            <a:ext cx="6858000" cy="6858000"/>
+          </a:xfrm>
+          <a:prstGeom prst="rect">
+            <a:avLst/>
+          </a:prstGeom>
+        </p:spPr>
+      </p:pic>
+    </p:spTree>
+    <p:extLst>
+      <p:ext uri="{BB962C8B-B14F-4D97-AF65-F5344CB8AC3E}">
+        <p14:creationId xmlns:p14="http://schemas.microsoft.com/office/powerpoint/2010/main" val="1395421951"/>
+      </p:ext>
+    </p:extLst>
+  </p:cSld>
+  <p:clrMapOvr>
+    <a:masterClrMapping/>
+  </p:clrMapOvr>
+</p:sld>
+</file>
+
+<file path=ppt/slides/slide8.xml><?xml version="1.0" encoding="utf-8"?>
+<p:sld xmlns:a="http://schemas.openxmlformats.org/drawingml/2006/main" xmlns:r="http://schemas.openxmlformats.org/officeDocument/2006/relationships" xmlns:p="http://schemas.openxmlformats.org/presentationml/2006/main">
+  <p:cSld>
+    <p:spTree>
+      <p:nvGrpSpPr>
+        <p:cNvPr id="1" name=""/>
+        <p:cNvGrpSpPr/>
+        <p:nvPr/>
+      </p:nvGrpSpPr>
+      <p:grpSpPr>
+        <a:xfrm>
+          <a:off x="0" y="0"/>
+          <a:ext cx="0" cy="0"/>
+          <a:chOff x="0" y="0"/>
+          <a:chExt cx="0" cy="0"/>
+        </a:xfrm>
+      </p:grpSpPr>
+      <p:grpSp>
+        <p:nvGrpSpPr>
+          <p:cNvPr id="8" name="Gruppieren 7"/>
+          <p:cNvGrpSpPr/>
+          <p:nvPr/>
+        </p:nvGrpSpPr>
+        <p:grpSpPr>
+          <a:xfrm>
+            <a:off x="2663930" y="0"/>
+            <a:ext cx="6864140" cy="6858000"/>
+            <a:chOff x="2663930" y="0"/>
+            <a:chExt cx="6864140" cy="6858000"/>
+          </a:xfrm>
+        </p:grpSpPr>
+        <p:pic>
+          <p:nvPicPr>
+            <p:cNvPr id="5" name="Grafik 4"/>
+            <p:cNvPicPr>
+              <a:picLocks noChangeAspect="1"/>
+            </p:cNvPicPr>
+            <p:nvPr/>
+          </p:nvPicPr>
+          <p:blipFill>
+            <a:blip r:embed="rId2">
+              <a:extLst>
+                <a:ext uri="{28A0092B-C50C-407E-A947-70E740481C1C}">
+                  <a14:useLocalDpi xmlns:a14="http://schemas.microsoft.com/office/drawing/2010/main" val="0"/>
+                </a:ext>
+              </a:extLst>
+            </a:blip>
+            <a:stretch>
+              <a:fillRect/>
+            </a:stretch>
+          </p:blipFill>
+          <p:spPr>
+            <a:xfrm>
+              <a:off x="2663930" y="0"/>
+              <a:ext cx="6864140" cy="6858000"/>
+            </a:xfrm>
+            <a:prstGeom prst="rect">
+              <a:avLst/>
+            </a:prstGeom>
+          </p:spPr>
+        </p:pic>
+        <p:sp>
+          <p:nvSpPr>
+            <p:cNvPr id="6" name="Rechteck 5"/>
+            <p:cNvSpPr/>
+            <p:nvPr/>
+          </p:nvSpPr>
+          <p:spPr>
+            <a:xfrm>
+              <a:off x="4476000" y="4057200"/>
+              <a:ext cx="3240000" cy="1260000"/>
+            </a:xfrm>
+            <a:prstGeom prst="rect">
+              <a:avLst/>
+            </a:prstGeom>
+            <a:solidFill>
+              <a:schemeClr val="tx1"/>
+            </a:solidFill>
+            <a:ln>
+              <a:noFill/>
+            </a:ln>
+          </p:spPr>
+          <p:style>
+            <a:lnRef idx="2">
+              <a:schemeClr val="accent1">
+                <a:shade val="50000"/>
+              </a:schemeClr>
+            </a:lnRef>
+            <a:fillRef idx="1">
+              <a:schemeClr val="accent1"/>
+            </a:fillRef>
+            <a:effectRef idx="0">
+              <a:schemeClr val="accent1"/>
+            </a:effectRef>
+            <a:fontRef idx="minor">
+              <a:schemeClr val="lt1"/>
+            </a:fontRef>
+          </p:style>
+          <p:txBody>
+            <a:bodyPr rtlCol="0" anchor="ctr"/>
+            <a:lstStyle/>
+            <a:p>
+              <a:pPr algn="ctr"/>
+              <a:r>
+                <a:rPr lang="de-DE" sz="9600" b="1" dirty="0" smtClean="0">
+                  <a:solidFill>
+                    <a:srgbClr val="353535"/>
+                  </a:solidFill>
+                </a:rPr>
+                <a:t>SBCs</a:t>
+              </a:r>
+              <a:endParaRPr lang="de-DE" sz="7200" b="1" dirty="0">
+                <a:solidFill>
+                  <a:srgbClr val="353535"/>
+                </a:solidFill>
+              </a:endParaRPr>
+            </a:p>
+          </p:txBody>
+        </p:sp>
+        <p:pic>
+          <p:nvPicPr>
+            <p:cNvPr id="7" name="Grafik 6"/>
+            <p:cNvPicPr>
+              <a:picLocks noChangeAspect="1"/>
+            </p:cNvPicPr>
+            <p:nvPr/>
+          </p:nvPicPr>
+          <p:blipFill rotWithShape="1">
+            <a:blip r:embed="rId3">
+              <a:extLst>
+                <a:ext uri="{28A0092B-C50C-407E-A947-70E740481C1C}">
+                  <a14:useLocalDpi xmlns:a14="http://schemas.microsoft.com/office/drawing/2010/main" val="0"/>
+                </a:ext>
+              </a:extLst>
+            </a:blip>
+            <a:srcRect l="19108" t="20147" r="19044" b="34431"/>
+            <a:stretch/>
+          </p:blipFill>
+          <p:spPr>
+            <a:xfrm>
+              <a:off x="4476000" y="1581150"/>
+              <a:ext cx="3240000" cy="2379492"/>
+            </a:xfrm>
+            <a:prstGeom prst="rect">
+              <a:avLst/>
+            </a:prstGeom>
+          </p:spPr>
+        </p:pic>
+      </p:grpSp>
+    </p:spTree>
+    <p:extLst>
+      <p:ext uri="{BB962C8B-B14F-4D97-AF65-F5344CB8AC3E}">
+        <p14:creationId xmlns:p14="http://schemas.microsoft.com/office/powerpoint/2010/main" val="4059622431"/>
+      </p:ext>
+    </p:extLst>
+  </p:cSld>
+  <p:clrMapOvr>
+    <a:masterClrMapping/>
+  </p:clrMapOvr>
+</p:sld>
+</file>
+
+<file path=ppt/slides/slide9.xml><?xml version="1.0" encoding="utf-8"?>
+<p:sld xmlns:a="http://schemas.openxmlformats.org/drawingml/2006/main" xmlns:r="http://schemas.openxmlformats.org/officeDocument/2006/relationships" xmlns:p="http://schemas.openxmlformats.org/presentationml/2006/main">
+  <p:cSld>
+    <p:spTree>
+      <p:nvGrpSpPr>
+        <p:cNvPr id="1" name=""/>
+        <p:cNvGrpSpPr/>
+        <p:nvPr/>
+      </p:nvGrpSpPr>
+      <p:grpSpPr>
+        <a:xfrm>
+          <a:off x="0" y="0"/>
+          <a:ext cx="0" cy="0"/>
+          <a:chOff x="0" y="0"/>
+          <a:chExt cx="0" cy="0"/>
+        </a:xfrm>
+      </p:grpSpPr>
+      <p:pic>
+        <p:nvPicPr>
+          <p:cNvPr id="8" name="Grafik 7"/>
+          <p:cNvPicPr>
+            <a:picLocks noChangeAspect="1"/>
+          </p:cNvPicPr>
+          <p:nvPr/>
+        </p:nvPicPr>
+        <p:blipFill>
+          <a:blip r:embed="rId2">
+            <a:clrChange>
+              <a:clrFrom>
+                <a:srgbClr val="353535"/>
+              </a:clrFrom>
+              <a:clrTo>
+                <a:srgbClr val="353535">
+                  <a:alpha val="0"/>
+                </a:srgbClr>
+              </a:clrTo>
+            </a:clrChange>
+          </a:blip>
+          <a:stretch>
+            <a:fillRect/>
+          </a:stretch>
+        </p:blipFill>
+        <p:spPr>
+          <a:xfrm>
+            <a:off x="2663654" y="-297"/>
+            <a:ext cx="6864691" cy="6858594"/>
+          </a:xfrm>
+          <a:prstGeom prst="rect">
+            <a:avLst/>
+          </a:prstGeom>
+        </p:spPr>
+      </p:pic>
+    </p:spTree>
+    <p:extLst>
+      <p:ext uri="{BB962C8B-B14F-4D97-AF65-F5344CB8AC3E}">
+        <p14:creationId xmlns:p14="http://schemas.microsoft.com/office/powerpoint/2010/main" val="3532233018"/>
+      </p:ext>
+    </p:extLst>
+  </p:cSld>
+  <p:clrMapOvr>
+    <a:masterClrMapping/>
+  </p:clrMapOvr>
+</p:sld>
+</file>
+
 <file path=ppt/theme/theme1.xml><?xml version="1.0" encoding="utf-8"?>
 <a:theme xmlns:a="http://schemas.openxmlformats.org/drawingml/2006/main" name="Office Theme">
   <a:themeElements>

</xml_diff>